<commit_message>
Fixed assignment 1 description
</commit_message>
<xml_diff>
--- a/lectures/01-introduction.pptx
+++ b/lectures/01-introduction.pptx
@@ -223,7 +223,7 @@
           <a:p>
             <a:fld id="{53CD2493-0AFC-45FB-85C8-B9D552CC01B0}" type="datetimeFigureOut">
               <a:rPr lang="en-US" smtClean="0"/>
-              <a:t>8/19/16</a:t>
+              <a:t>8/25/16</a:t>
             </a:fld>
             <a:endParaRPr lang="en-US"/>
           </a:p>
@@ -1533,7 +1533,7 @@
             <a:fld id="{8DF9E8F3-4849-FA48-B4C8-2D894E979956}" type="datetimeFigureOut">
               <a:rPr lang="nn-NO" smtClean="0"/>
               <a:pPr/>
-              <a:t>19.08.2016</a:t>
+              <a:t>25.08.2016</a:t>
             </a:fld>
             <a:endParaRPr lang="nn-NO"/>
           </a:p>
@@ -1818,7 +1818,7 @@
             <a:fld id="{8DF9E8F3-4849-FA48-B4C8-2D894E979956}" type="datetimeFigureOut">
               <a:rPr lang="nn-NO" smtClean="0"/>
               <a:pPr/>
-              <a:t>19.08.2016</a:t>
+              <a:t>25.08.2016</a:t>
             </a:fld>
             <a:endParaRPr lang="nn-NO"/>
           </a:p>
@@ -1933,7 +1933,7 @@
             <a:fld id="{8DF9E8F3-4849-FA48-B4C8-2D894E979956}" type="datetimeFigureOut">
               <a:rPr lang="nn-NO" smtClean="0"/>
               <a:pPr/>
-              <a:t>19.08.2016</a:t>
+              <a:t>25.08.2016</a:t>
             </a:fld>
             <a:endParaRPr lang="nn-NO"/>
           </a:p>
@@ -2083,7 +2083,7 @@
             <a:fld id="{8DF9E8F3-4849-FA48-B4C8-2D894E979956}" type="datetimeFigureOut">
               <a:rPr lang="nn-NO" smtClean="0"/>
               <a:pPr/>
-              <a:t>19.08.2016</a:t>
+              <a:t>25.08.2016</a:t>
             </a:fld>
             <a:endParaRPr lang="nn-NO"/>
           </a:p>
@@ -2175,7 +2175,7 @@
             <a:fld id="{8DF9E8F3-4849-FA48-B4C8-2D894E979956}" type="datetimeFigureOut">
               <a:rPr lang="nn-NO" smtClean="0"/>
               <a:pPr/>
-              <a:t>19.08.2016</a:t>
+              <a:t>25.08.2016</a:t>
             </a:fld>
             <a:endParaRPr lang="nn-NO" dirty="0"/>
           </a:p>
@@ -3002,7 +3002,7 @@
             <a:fld id="{8DF9E8F3-4849-FA48-B4C8-2D894E979956}" type="datetimeFigureOut">
               <a:rPr lang="nn-NO" smtClean="0"/>
               <a:pPr/>
-              <a:t>19.08.2016</a:t>
+              <a:t>25.08.2016</a:t>
             </a:fld>
             <a:endParaRPr lang="nn-NO" dirty="0"/>
           </a:p>
@@ -3574,23 +3574,14 @@
             </a:r>
             <a:r>
               <a:rPr lang="en-US" sz="2000" dirty="0" smtClean="0"/>
-              <a:t>nf-2202 </a:t>
-            </a:r>
+              <a:t>nf-2202 Concurrent and Data-intensive Programming</a:t>
+            </a:r>
+          </a:p>
+          <a:p>
             <a:r>
               <a:rPr lang="en-US" sz="2000" dirty="0" smtClean="0"/>
-              <a:t>Concurrent and Data-intensive Programming</a:t>
-            </a:r>
-          </a:p>
-          <a:p>
-            <a:r>
-              <a:rPr lang="en-US" sz="2000" dirty="0" smtClean="0"/>
-              <a:t>Fall </a:t>
-            </a:r>
-            <a:r>
-              <a:rPr lang="en-US" sz="2000" dirty="0" smtClean="0"/>
-              <a:t>2016</a:t>
-            </a:r>
-            <a:endParaRPr lang="en-US" sz="2000" dirty="0" smtClean="0"/>
+              <a:t>Fall 2016</a:t>
+            </a:r>
           </a:p>
           <a:p>
             <a:r>
@@ -3710,13 +3701,8 @@
           <a:p>
             <a:r>
               <a:rPr lang="en-US" dirty="0" smtClean="0"/>
-              <a:t>Mailing list: </a:t>
-            </a:r>
-            <a:r>
-              <a:rPr lang="en-US" dirty="0" smtClean="0"/>
-              <a:t>inf-2202-f16@list.uit.no</a:t>
-            </a:r>
-            <a:endParaRPr lang="en-US" dirty="0" smtClean="0"/>
+              <a:t>Mailing list: inf-2202-f16@list.uit.no</a:t>
+            </a:r>
           </a:p>
           <a:p>
             <a:r>
@@ -3754,7 +3740,6 @@
               <a:rPr lang="en-US" dirty="0" smtClean="0"/>
               <a:t>/ It’s Learning</a:t>
             </a:r>
-            <a:endParaRPr lang="en-US" dirty="0" smtClean="0"/>
           </a:p>
         </p:txBody>
       </p:sp>
@@ -3835,11 +3820,7 @@
           <a:p>
             <a:r>
               <a:rPr lang="en-US" dirty="0" smtClean="0"/>
-              <a:t>Make sure you are subscribed to the mailing </a:t>
-            </a:r>
-            <a:r>
-              <a:rPr lang="en-US" dirty="0" smtClean="0"/>
-              <a:t>list</a:t>
+              <a:t>Make sure you are subscribed to the mailing list</a:t>
             </a:r>
           </a:p>
           <a:p>
@@ -3872,7 +3853,6 @@
               <a:rPr lang="en-US" dirty="0" smtClean="0"/>
               <a:t> email</a:t>
             </a:r>
-            <a:endParaRPr lang="en-US" dirty="0" smtClean="0"/>
           </a:p>
           <a:p>
             <a:r>
@@ -3885,11 +3865,7 @@
             </a:r>
             <a:r>
               <a:rPr lang="en-US" dirty="0" smtClean="0"/>
-              <a:t> </a:t>
-            </a:r>
-            <a:r>
-              <a:rPr lang="en-US" dirty="0" smtClean="0"/>
-              <a:t>account</a:t>
+              <a:t> account</a:t>
             </a:r>
           </a:p>
           <a:p>
@@ -4278,9 +4254,10 @@
           <a:p>
             <a:pPr marL="857250" lvl="1" indent="-457200"/>
             <a:r>
-              <a:rPr lang="en-US" dirty="0" smtClean="0"/>
-              <a:t>C or Python</a:t>
-            </a:r>
+              <a:rPr lang="en-US" smtClean="0"/>
+              <a:t>C</a:t>
+            </a:r>
+            <a:endParaRPr lang="en-US" dirty="0" smtClean="0"/>
           </a:p>
           <a:p>
             <a:pPr marL="457200" indent="-457200">
@@ -4322,7 +4299,6 @@
               <a:rPr lang="en-US" dirty="0" smtClean="0"/>
               <a:t>PageRank</a:t>
             </a:r>
-            <a:endParaRPr lang="en-US" dirty="0" smtClean="0"/>
           </a:p>
           <a:p>
             <a:pPr marL="857250" lvl="1" indent="-457200"/>
@@ -4476,11 +4452,7 @@
             <a:pPr lvl="1"/>
             <a:r>
               <a:rPr lang="en-US" dirty="0" smtClean="0"/>
-              <a:t>Someone tells you how to do </a:t>
-            </a:r>
-            <a:r>
-              <a:rPr lang="en-US" dirty="0" smtClean="0"/>
-              <a:t>it</a:t>
+              <a:t>Someone tells you how to do it</a:t>
             </a:r>
           </a:p>
           <a:p>
@@ -6073,11 +6045,7 @@
           <a:p>
             <a:r>
               <a:rPr lang="en-US" dirty="0" smtClean="0"/>
-              <a:t>Motivation - </a:t>
-            </a:r>
-            <a:r>
-              <a:rPr lang="en-US" dirty="0" smtClean="0"/>
-              <a:t>summary</a:t>
+              <a:t>Motivation - summary</a:t>
             </a:r>
             <a:endParaRPr lang="en-US" dirty="0"/>
           </a:p>

</xml_diff>